<commit_message>
Moved extra slides into seperate section
</commit_message>
<xml_diff>
--- a/presentation/presentation.pptx
+++ b/presentation/presentation.pptx
@@ -122,6 +122,32 @@
     </a:lvl9pPr>
   </p:defaultTextStyle>
   <p:extLst>
+    <p:ext uri="{521415D9-36F7-43E2-AB2F-B90AF26B5E84}">
+      <p14:sectionLst xmlns:p14="http://schemas.microsoft.com/office/powerpoint/2010/main">
+        <p14:section name="Default Section" id="{B8EDF61C-5FAC-4585-BE68-087C0E622E96}">
+          <p14:sldIdLst>
+            <p14:sldId id="257"/>
+            <p14:sldId id="260"/>
+            <p14:sldId id="263"/>
+            <p14:sldId id="286"/>
+            <p14:sldId id="266"/>
+            <p14:sldId id="291"/>
+            <p14:sldId id="265"/>
+            <p14:sldId id="287"/>
+            <p14:sldId id="289"/>
+            <p14:sldId id="290"/>
+            <p14:sldId id="292"/>
+            <p14:sldId id="288"/>
+          </p14:sldIdLst>
+        </p14:section>
+        <p14:section name="Extra Slides" id="{FF42D31E-DF8E-49A0-A889-D28FE5AC1455}">
+          <p14:sldIdLst>
+            <p14:sldId id="293"/>
+            <p14:sldId id="294"/>
+          </p14:sldIdLst>
+        </p14:section>
+      </p14:sectionLst>
+    </p:ext>
     <p:ext uri="{EFAFB233-063F-42B5-8137-9DF3F51BA10A}">
       <p15:sldGuideLst xmlns:p15="http://schemas.microsoft.com/office/powerpoint/2012/main"/>
     </p:ext>
@@ -22113,6 +22139,12 @@
           </a:p>
           <a:p>
             <a:pPr lvl="1"/>
+            <a:endParaRPr lang="en-US" dirty="0">
+              <a:latin typeface="Calibri"/>
+            </a:endParaRPr>
+          </a:p>
+          <a:p>
+            <a:pPr lvl="1"/>
             <a:r>
               <a:rPr lang="en-US" dirty="0">
                 <a:latin typeface="Calibri"/>
@@ -22156,13 +22188,15 @@
               </a:ext>
             </a:extLst>
           </a:blip>
-          <a:srcRect/>
-          <a:stretch/>
+          <a:srcRect r="11862"/>
+          <a:stretch>
+            <a:fillRect/>
+          </a:stretch>
         </p:blipFill>
         <p:spPr>
           <a:xfrm>
-            <a:off x="939789" y="3172074"/>
-            <a:ext cx="7616491" cy="2095459"/>
+            <a:off x="770688" y="3224092"/>
+            <a:ext cx="8216737" cy="2564847"/>
           </a:xfrm>
           <a:prstGeom prst="rect">
             <a:avLst/>
@@ -22187,7 +22221,7 @@
         </p:nvSpPr>
         <p:spPr>
           <a:xfrm>
-            <a:off x="939789" y="5195176"/>
+            <a:off x="4024250" y="2988372"/>
             <a:ext cx="5906173" cy="261609"/>
           </a:xfrm>
           <a:prstGeom prst="rect">
@@ -22231,7 +22265,7 @@
                 <a:uFillTx/>
                 <a:latin typeface="Arial"/>
               </a:rPr>
-              <a:t>Screenshots taken from </a:t>
+              <a:t>Screenshot taken from </a:t>
             </a:r>
             <a:r>
               <a:rPr lang="en-US" sz="1100" b="0" i="0" u="none" strike="noStrike" kern="1200" cap="none" spc="0" baseline="0" dirty="0" err="1">
@@ -23288,8 +23322,17 @@
                   <a:srgbClr val="344A9A"/>
                 </a:solidFill>
               </a:rPr>
-              <a:t>Results</a:t>
-            </a:r>
+              <a:t>Results: </a:t>
+            </a:r>
+            <a:r>
+              <a:rPr lang="en-US" dirty="0"/>
+              <a:t>Improvement on existing features, new features</a:t>
+            </a:r>
+            <a:endParaRPr lang="en-US" b="1" dirty="0">
+              <a:solidFill>
+                <a:srgbClr val="344A9A"/>
+              </a:solidFill>
+            </a:endParaRPr>
           </a:p>
           <a:p>
             <a:pPr marL="342900" lvl="0" indent="-342900">
@@ -23301,9 +23344,12 @@
                   <a:srgbClr val="344A9A"/>
                 </a:solidFill>
               </a:rPr>
-              <a:t>Future Work</a:t>
-            </a:r>
-            <a:endParaRPr lang="en-US" dirty="0"/>
+              <a:t>Conclusion: </a:t>
+            </a:r>
+            <a:r>
+              <a:rPr lang="en-US" dirty="0"/>
+              <a:t>Goals Reached &amp; Future Work</a:t>
+            </a:r>
           </a:p>
         </p:txBody>
       </p:sp>

</xml_diff>

<commit_message>
Added presentation in .pdf and .gif format, modified order of talking points in conclusion
</commit_message>
<xml_diff>
--- a/presentation/presentation.pptx
+++ b/presentation/presentation.pptx
@@ -505,7 +505,7 @@
             <a:fld id="{99B41632-069F-48D6-8112-7097209EFB99}" type="datetime1">
               <a:rPr lang="de-DE"/>
               <a:pPr lvl="0"/>
-              <a:t>12.07.2025</a:t>
+              <a:t>13.07.2025</a:t>
             </a:fld>
             <a:endParaRPr lang="de-DE"/>
           </a:p>
@@ -2913,7 +2913,7 @@
             <a:fld id="{CD6543D6-383C-4F0E-965A-E8FC81277722}" type="datetime4">
               <a:rPr lang="de-DE"/>
               <a:pPr lvl="0"/>
-              <a:t>12. Juli 2025</a:t>
+              <a:t>13. Juli 2025</a:t>
             </a:fld>
             <a:endParaRPr lang="de-DE"/>
           </a:p>
@@ -3127,7 +3127,7 @@
             <a:fld id="{4FE2F17A-C21A-478B-88E9-0477DBEC62B8}" type="datetime4">
               <a:rPr lang="de-DE"/>
               <a:pPr lvl="0"/>
-              <a:t>12. Juli 2025</a:t>
+              <a:t>13. Juli 2025</a:t>
             </a:fld>
             <a:endParaRPr lang="de-DE"/>
           </a:p>
@@ -3371,7 +3371,7 @@
             <a:fld id="{16E27B38-1345-4CAE-9188-106B0173E1CC}" type="datetime4">
               <a:rPr lang="de-DE"/>
               <a:pPr lvl="0"/>
-              <a:t>12. Juli 2025</a:t>
+              <a:t>13. Juli 2025</a:t>
             </a:fld>
             <a:endParaRPr lang="de-DE"/>
           </a:p>
@@ -3659,7 +3659,7 @@
             <a:fld id="{FCD3004D-868A-4CBF-B97B-75BC0B8FDA1B}" type="datetime4">
               <a:rPr lang="de-DE"/>
               <a:pPr lvl="0"/>
-              <a:t>12. Juli 2025</a:t>
+              <a:t>13. Juli 2025</a:t>
             </a:fld>
             <a:endParaRPr lang="de-DE"/>
           </a:p>
@@ -3868,7 +3868,7 @@
             <a:fld id="{84601751-AA5B-49FF-AAE1-6963C5B7D9BF}" type="datetime4">
               <a:rPr lang="de-DE"/>
               <a:pPr lvl="0"/>
-              <a:t>12. Juli 2025</a:t>
+              <a:t>13. Juli 2025</a:t>
             </a:fld>
             <a:endParaRPr lang="de-DE"/>
           </a:p>
@@ -4072,7 +4072,7 @@
             <a:fld id="{E8FF77A1-B0AA-4303-BA6B-A020EBC0BF66}" type="datetime4">
               <a:rPr lang="de-DE"/>
               <a:pPr lvl="0"/>
-              <a:t>12. Juli 2025</a:t>
+              <a:t>13. Juli 2025</a:t>
             </a:fld>
             <a:endParaRPr lang="de-DE"/>
           </a:p>
@@ -4355,7 +4355,7 @@
             <a:fld id="{EDB87B34-8F10-4D18-A87D-5F957CCA7471}" type="datetime4">
               <a:rPr lang="de-DE"/>
               <a:pPr lvl="0"/>
-              <a:t>12. Juli 2025</a:t>
+              <a:t>13. Juli 2025</a:t>
             </a:fld>
             <a:endParaRPr lang="de-DE"/>
           </a:p>
@@ -4603,7 +4603,7 @@
             <a:fld id="{40D46405-2165-412A-B5A9-A689289A2722}" type="datetime4">
               <a:rPr lang="de-DE"/>
               <a:pPr lvl="0"/>
-              <a:t>12. Juli 2025</a:t>
+              <a:t>13. Juli 2025</a:t>
             </a:fld>
             <a:endParaRPr lang="de-DE"/>
           </a:p>
@@ -4807,7 +4807,7 @@
             <a:fld id="{A96CC717-5921-48B5-9145-5DBBA813FC80}" type="datetime4">
               <a:rPr lang="de-DE"/>
               <a:pPr lvl="0"/>
-              <a:t>12. Juli 2025</a:t>
+              <a:t>13. Juli 2025</a:t>
             </a:fld>
             <a:endParaRPr lang="de-DE"/>
           </a:p>
@@ -5055,7 +5055,7 @@
             <a:fld id="{B8C4394D-1D5E-4CC1-91F0-9284DCB9DDDB}" type="datetime4">
               <a:rPr lang="de-DE"/>
               <a:pPr lvl="0"/>
-              <a:t>12. Juli 2025</a:t>
+              <a:t>13. Juli 2025</a:t>
             </a:fld>
             <a:endParaRPr lang="de-DE"/>
           </a:p>
@@ -5963,7 +5963,7 @@
             <a:fld id="{6AE3A700-2C46-46F3-8A79-E45631798C00}" type="datetime4">
               <a:rPr lang="de-DE"/>
               <a:pPr lvl="0"/>
-              <a:t>12. Juli 2025</a:t>
+              <a:t>13. Juli 2025</a:t>
             </a:fld>
             <a:endParaRPr lang="de-DE"/>
           </a:p>
@@ -6262,7 +6262,7 @@
             <a:fld id="{3F569A98-3955-400C-BF1D-D7E7E09072C5}" type="datetime4">
               <a:rPr lang="de-DE"/>
               <a:pPr lvl="0"/>
-              <a:t>12. Juli 2025</a:t>
+              <a:t>13. Juli 2025</a:t>
             </a:fld>
             <a:endParaRPr lang="de-DE"/>
           </a:p>
@@ -6733,7 +6733,7 @@
             <a:fld id="{623C9C3C-0C83-49D0-8F9C-6EF0F6F82A1A}" type="datetime4">
               <a:rPr lang="de-DE"/>
               <a:pPr lvl="0"/>
-              <a:t>12. Juli 2025</a:t>
+              <a:t>13. Juli 2025</a:t>
             </a:fld>
             <a:endParaRPr lang="de-DE"/>
           </a:p>
@@ -7207,7 +7207,7 @@
             <a:fld id="{8B57F709-8E32-405E-AD84-DC8083A5C54B}" type="datetime4">
               <a:rPr lang="de-DE"/>
               <a:pPr lvl="0"/>
-              <a:t>12. Juli 2025</a:t>
+              <a:t>13. Juli 2025</a:t>
             </a:fld>
             <a:endParaRPr lang="de-DE"/>
           </a:p>
@@ -7338,7 +7338,7 @@
             <a:fld id="{4E8381F7-B714-43B4-B365-C1A70FFB8FE3}" type="datetime4">
               <a:rPr lang="de-DE"/>
               <a:pPr lvl="0"/>
-              <a:t>12. Juli 2025</a:t>
+              <a:t>13. Juli 2025</a:t>
             </a:fld>
             <a:endParaRPr lang="de-DE"/>
           </a:p>
@@ -7522,7 +7522,7 @@
             <a:fld id="{A0297AD3-829B-4B35-AD11-107AC625D8AF}" type="datetime4">
               <a:rPr lang="de-DE"/>
               <a:pPr lvl="0"/>
-              <a:t>12. Juli 2025</a:t>
+              <a:t>13. Juli 2025</a:t>
             </a:fld>
             <a:endParaRPr lang="de-DE"/>
           </a:p>
@@ -9101,7 +9101,7 @@
             <a:fld id="{094D5377-B346-4830-A292-4BD6E375916B}" type="datetime4">
               <a:rPr lang="de-DE"/>
               <a:pPr lvl="0"/>
-              <a:t>12. Juli 2025</a:t>
+              <a:t>13. Juli 2025</a:t>
             </a:fld>
             <a:endParaRPr lang="de-DE"/>
           </a:p>
@@ -9675,7 +9675,7 @@
             <a:fld id="{5698949A-D1DF-41B2-9889-84E88E55D60F}" type="datetime4">
               <a:rPr lang="de-DE"/>
               <a:pPr lvl="0"/>
-              <a:t>12. Juli 2025</a:t>
+              <a:t>13. Juli 2025</a:t>
             </a:fld>
             <a:endParaRPr lang="de-DE"/>
           </a:p>
@@ -10068,7 +10068,7 @@
             <a:fld id="{8A5A54B7-6719-41BF-8E0A-3D4F08824594}" type="datetime4">
               <a:rPr lang="de-DE"/>
               <a:pPr lvl="0"/>
-              <a:t>12. Juli 2025</a:t>
+              <a:t>13. Juli 2025</a:t>
             </a:fld>
             <a:endParaRPr lang="de-DE"/>
           </a:p>
@@ -10237,7 +10237,7 @@
             <a:fld id="{3A7FBFFB-4C9A-40EA-8116-F21085C3E496}" type="datetime4">
               <a:rPr lang="de-DE"/>
               <a:pPr lvl="0"/>
-              <a:t>12. Juli 2025</a:t>
+              <a:t>13. Juli 2025</a:t>
             </a:fld>
             <a:endParaRPr lang="de-DE"/>
           </a:p>
@@ -10479,7 +10479,7 @@
             <a:fld id="{B3A3DFAF-AC8B-4741-BD5B-148CB659AD13}" type="datetime4">
               <a:rPr lang="de-DE"/>
               <a:pPr lvl="0"/>
-              <a:t>12. Juli 2025</a:t>
+              <a:t>13. Juli 2025</a:t>
             </a:fld>
             <a:endParaRPr lang="de-DE"/>
           </a:p>
@@ -10889,7 +10889,7 @@
             <a:fld id="{0CFB9883-08DF-4530-90E6-CB353220928E}" type="datetime4">
               <a:rPr lang="de-DE"/>
               <a:pPr lvl="0"/>
-              <a:t>12. Juli 2025</a:t>
+              <a:t>13. Juli 2025</a:t>
             </a:fld>
             <a:endParaRPr lang="de-DE"/>
           </a:p>
@@ -11257,7 +11257,7 @@
             <a:fld id="{56B080E7-B989-4EA6-BF19-37307657C6EE}" type="datetime4">
               <a:rPr lang="de-DE"/>
               <a:pPr lvl="0"/>
-              <a:t>12. Juli 2025</a:t>
+              <a:t>13. Juli 2025</a:t>
             </a:fld>
             <a:endParaRPr lang="de-DE"/>
           </a:p>
@@ -11547,7 +11547,7 @@
             <a:fld id="{63649560-F823-49FD-908E-89FF72ED5BF8}" type="datetime4">
               <a:rPr lang="de-DE"/>
               <a:pPr lvl="0"/>
-              <a:t>12. Juli 2025</a:t>
+              <a:t>13. Juli 2025</a:t>
             </a:fld>
             <a:endParaRPr lang="de-DE"/>
           </a:p>
@@ -11789,7 +11789,7 @@
             <a:fld id="{172A3027-64A8-4CCB-BE74-C74EA1F8D594}" type="datetime4">
               <a:rPr lang="de-DE"/>
               <a:pPr lvl="0"/>
-              <a:t>12. Juli 2025</a:t>
+              <a:t>13. Juli 2025</a:t>
             </a:fld>
             <a:endParaRPr lang="de-DE"/>
           </a:p>
@@ -12074,7 +12074,7 @@
             <a:fld id="{2C7F44E5-9FED-4575-9E92-AB612E5DD227}" type="datetime4">
               <a:rPr lang="de-DE"/>
               <a:pPr lvl="0"/>
-              <a:t>12. Juli 2025</a:t>
+              <a:t>13. Juli 2025</a:t>
             </a:fld>
             <a:endParaRPr lang="de-DE"/>
           </a:p>
@@ -12281,7 +12281,7 @@
             <a:fld id="{38C8D9E8-17A5-4ED3-95B7-2AAD57A82B92}" type="datetime4">
               <a:rPr lang="de-DE"/>
               <a:pPr lvl="0"/>
-              <a:t>12. Juli 2025</a:t>
+              <a:t>13. Juli 2025</a:t>
             </a:fld>
             <a:endParaRPr lang="de-DE"/>
           </a:p>
@@ -12628,7 +12628,7 @@
             <a:fld id="{E9BA7A50-0C5E-40A3-BFA8-AE3D1086347F}" type="datetime4">
               <a:rPr lang="de-DE"/>
               <a:pPr lvl="0"/>
-              <a:t>12. Juli 2025</a:t>
+              <a:t>13. Juli 2025</a:t>
             </a:fld>
             <a:endParaRPr lang="de-DE"/>
           </a:p>
@@ -12793,7 +12793,7 @@
             <a:fld id="{0D30BD99-EB4B-41D8-A0CA-98113F2286A4}" type="datetime4">
               <a:rPr lang="de-DE"/>
               <a:pPr lvl="0"/>
-              <a:t>12. Juli 2025</a:t>
+              <a:t>13. Juli 2025</a:t>
             </a:fld>
             <a:endParaRPr lang="de-DE"/>
           </a:p>
@@ -13073,7 +13073,7 @@
             <a:fld id="{5C5EBCD5-3B81-48A7-A5E0-992DC4F7F974}" type="datetime4">
               <a:rPr lang="de-DE"/>
               <a:pPr lvl="0"/>
-              <a:t>12. Juli 2025</a:t>
+              <a:t>13. Juli 2025</a:t>
             </a:fld>
             <a:endParaRPr lang="de-DE"/>
           </a:p>
@@ -13318,7 +13318,7 @@
             <a:fld id="{F15A6E41-D07D-48C2-AC8B-114638175B01}" type="datetime4">
               <a:rPr lang="de-DE"/>
               <a:pPr lvl="0"/>
-              <a:t>12. Juli 2025</a:t>
+              <a:t>13. Juli 2025</a:t>
             </a:fld>
             <a:endParaRPr lang="de-DE"/>
           </a:p>
@@ -13520,7 +13520,7 @@
             <a:fld id="{459F87E8-4CC1-4E4C-ACB4-CECDA872E2F8}" type="datetime4">
               <a:rPr lang="de-DE"/>
               <a:pPr lvl="0"/>
-              <a:t>12. Juli 2025</a:t>
+              <a:t>13. Juli 2025</a:t>
             </a:fld>
             <a:endParaRPr lang="de-DE"/>
           </a:p>
@@ -13765,7 +13765,7 @@
             <a:fld id="{6CCC58C2-ED5A-48D3-BD08-D9CB24906B4B}" type="datetime4">
               <a:rPr lang="de-DE"/>
               <a:pPr lvl="0"/>
-              <a:t>12. Juli 2025</a:t>
+              <a:t>13. Juli 2025</a:t>
             </a:fld>
             <a:endParaRPr lang="de-DE"/>
           </a:p>
@@ -14007,7 +14007,7 @@
             <a:fld id="{73A1FB07-68FB-467D-87F4-06351E49F6B3}" type="datetime4">
               <a:rPr lang="de-DE"/>
               <a:pPr lvl="0"/>
-              <a:t>12. Juli 2025</a:t>
+              <a:t>13. Juli 2025</a:t>
             </a:fld>
             <a:endParaRPr lang="de-DE"/>
           </a:p>
@@ -14288,7 +14288,7 @@
             <a:fld id="{7C8A22F7-493D-4E6D-9018-EFF9AAD139FD}" type="datetime4">
               <a:rPr lang="de-DE"/>
               <a:pPr lvl="0"/>
-              <a:t>12. Juli 2025</a:t>
+              <a:t>13. Juli 2025</a:t>
             </a:fld>
             <a:endParaRPr lang="de-DE"/>
           </a:p>
@@ -14754,7 +14754,7 @@
             <a:fld id="{E035DBEF-51DF-4AD4-8A4F-EFCF07BE0766}" type="datetime4">
               <a:rPr lang="de-DE"/>
               <a:pPr lvl="0"/>
-              <a:t>12. Juli 2025</a:t>
+              <a:t>13. Juli 2025</a:t>
             </a:fld>
             <a:endParaRPr lang="de-DE"/>
           </a:p>
@@ -15221,7 +15221,7 @@
             <a:fld id="{659A9430-FDB3-4899-8A5C-A44797862664}" type="datetime4">
               <a:rPr lang="de-DE"/>
               <a:pPr lvl="0"/>
-              <a:t>12. Juli 2025</a:t>
+              <a:t>13. Juli 2025</a:t>
             </a:fld>
             <a:endParaRPr lang="de-DE"/>
           </a:p>
@@ -15352,7 +15352,7 @@
             <a:fld id="{F87F329E-B2CA-437C-8477-D94886C5C7B3}" type="datetime4">
               <a:rPr lang="de-DE"/>
               <a:pPr lvl="0"/>
-              <a:t>12. Juli 2025</a:t>
+              <a:t>13. Juli 2025</a:t>
             </a:fld>
             <a:endParaRPr lang="de-DE"/>
           </a:p>
@@ -15661,7 +15661,7 @@
             <a:fld id="{57EFC22C-0657-494B-91B8-172AC9DCB06C}" type="datetime4">
               <a:rPr lang="de-DE"/>
               <a:pPr lvl="0"/>
-              <a:t>12. Juli 2025</a:t>
+              <a:t>13. Juli 2025</a:t>
             </a:fld>
             <a:endParaRPr lang="de-DE"/>
           </a:p>
@@ -15840,7 +15840,7 @@
             <a:fld id="{D4A3CB55-43DA-4FC3-87E9-4F87D89EB1EC}" type="datetime4">
               <a:rPr lang="de-DE"/>
               <a:pPr lvl="0"/>
-              <a:t>12. Juli 2025</a:t>
+              <a:t>13. Juli 2025</a:t>
             </a:fld>
             <a:endParaRPr lang="de-DE"/>
           </a:p>
@@ -16332,7 +16332,7 @@
             <a:fld id="{EFAD4C63-C4A8-4426-8B37-6947F614C924}" type="datetime4">
               <a:rPr lang="de-DE"/>
               <a:pPr lvl="0"/>
-              <a:t>12. Juli 2025</a:t>
+              <a:t>13. Juli 2025</a:t>
             </a:fld>
             <a:endParaRPr lang="de-DE"/>
           </a:p>
@@ -16576,7 +16576,7 @@
             <a:fld id="{19B3ED3E-F133-48A9-9F5A-8597003BD4D5}" type="datetime4">
               <a:rPr lang="de-DE"/>
               <a:pPr lvl="0"/>
-              <a:t>12. Juli 2025</a:t>
+              <a:t>13. Juli 2025</a:t>
             </a:fld>
             <a:endParaRPr lang="de-DE"/>
           </a:p>
@@ -16742,7 +16742,7 @@
             <a:fld id="{32E18DED-A704-450B-B8FC-04A924E29780}" type="datetime4">
               <a:rPr lang="de-DE"/>
               <a:pPr lvl="0"/>
-              <a:t>12. Juli 2025</a:t>
+              <a:t>13. Juli 2025</a:t>
             </a:fld>
             <a:endParaRPr lang="de-DE"/>
           </a:p>
@@ -17156,7 +17156,7 @@
             <a:fld id="{D1B03F6D-9048-4D17-B1F3-FC18BB8186E2}" type="datetime4">
               <a:rPr lang="de-DE"/>
               <a:pPr lvl="0"/>
-              <a:t>12. Juli 2025</a:t>
+              <a:t>13. Juli 2025</a:t>
             </a:fld>
             <a:endParaRPr lang="de-DE"/>
           </a:p>
@@ -17632,7 +17632,7 @@
             <a:fld id="{7A0A60FC-1CB8-4631-859C-7C1BE8C674D5}" type="datetime4">
               <a:rPr lang="de-DE"/>
               <a:pPr lvl="0"/>
-              <a:t>12. Juli 2025</a:t>
+              <a:t>13. Juli 2025</a:t>
             </a:fld>
             <a:endParaRPr lang="de-DE"/>
           </a:p>
@@ -18392,7 +18392,7 @@
             <a:fld id="{D0ECAB24-BD29-4ADE-B273-4175E305A902}" type="datetime4">
               <a:rPr lang="de-DE"/>
               <a:pPr lvl="0"/>
-              <a:t>12. Juli 2025</a:t>
+              <a:t>13. Juli 2025</a:t>
             </a:fld>
             <a:endParaRPr lang="de-DE"/>
           </a:p>
@@ -19411,7 +19411,7 @@
                   <a:uFillTx/>
                 </a:defRPr>
               </a:pPr>
-              <a:t>12. Juli 2025</a:t>
+              <a:t>13. Juli 2025</a:t>
             </a:fld>
             <a:endParaRPr lang="de-DE" sz="900" b="0" i="0" u="none" strike="noStrike" kern="1200" cap="none" spc="0" baseline="0">
               <a:solidFill>
@@ -21364,7 +21364,7 @@
                   <a:uFillTx/>
                 </a:defRPr>
               </a:pPr>
-              <a:t>12. Juli 2025</a:t>
+              <a:t>13. Juli 2025</a:t>
             </a:fld>
             <a:endParaRPr lang="de-DE" sz="900" b="0" i="0" u="none" strike="noStrike" kern="1200" cap="none" spc="0" baseline="0">
               <a:solidFill>
@@ -22274,7 +22274,7 @@
                   <a:uFillTx/>
                 </a:defRPr>
               </a:pPr>
-              <a:t>12. Juli 2025</a:t>
+              <a:t>13. Juli 2025</a:t>
             </a:fld>
             <a:endParaRPr lang="de-DE" sz="900" b="0" i="0" u="none" strike="noStrike" kern="1200" cap="none" spc="0" baseline="0">
               <a:solidFill>
@@ -22447,7 +22447,31 @@
               <a:rPr lang="en-US" b="1" dirty="0">
                 <a:latin typeface="Calibri"/>
               </a:rPr>
-              <a:t>Expand to other versions of </a:t>
+              <a:t>Improve Memory View:</a:t>
+            </a:r>
+          </a:p>
+          <a:p>
+            <a:pPr lvl="1"/>
+            <a:r>
+              <a:rPr lang="en-US">
+                <a:latin typeface="Calibri"/>
+              </a:rPr>
+              <a:t>Using “watch expression” is cumbersome</a:t>
+            </a:r>
+          </a:p>
+          <a:p>
+            <a:pPr lvl="0"/>
+            <a:r>
+              <a:rPr lang="en-US" b="1">
+                <a:latin typeface="Calibri"/>
+              </a:rPr>
+              <a:t>Expand </a:t>
+            </a:r>
+            <a:r>
+              <a:rPr lang="en-US" b="1" dirty="0">
+                <a:latin typeface="Calibri"/>
+              </a:rPr>
+              <a:t>to other versions of </a:t>
             </a:r>
             <a:r>
               <a:rPr lang="en-US" b="1" dirty="0" err="1">
@@ -22458,24 +22482,6 @@
             <a:endParaRPr lang="en-US" b="1" dirty="0">
               <a:latin typeface="Calibri"/>
             </a:endParaRPr>
-          </a:p>
-          <a:p>
-            <a:pPr lvl="0"/>
-            <a:r>
-              <a:rPr lang="en-US" b="1" dirty="0">
-                <a:latin typeface="Calibri"/>
-              </a:rPr>
-              <a:t>Improve Memory View:</a:t>
-            </a:r>
-          </a:p>
-          <a:p>
-            <a:pPr lvl="1"/>
-            <a:r>
-              <a:rPr lang="en-US" dirty="0">
-                <a:latin typeface="Calibri"/>
-              </a:rPr>
-              <a:t>Using “watch expression” is cumbersome</a:t>
-            </a:r>
           </a:p>
           <a:p>
             <a:pPr lvl="0"/>
@@ -24457,7 +24463,7 @@
                   <a:uFillTx/>
                 </a:defRPr>
               </a:pPr>
-              <a:t>July 12, 2025</a:t>
+              <a:t>July 13, 2025</a:t>
             </a:fld>
             <a:endParaRPr lang="en-US" sz="900" b="0" i="0" u="none" strike="noStrike" kern="1200" cap="none" spc="0" baseline="0">
               <a:solidFill>
@@ -24748,7 +24754,7 @@
                   <a:uFillTx/>
                 </a:defRPr>
               </a:pPr>
-              <a:t>July 12, 2025</a:t>
+              <a:t>July 13, 2025</a:t>
             </a:fld>
             <a:endParaRPr lang="en-US" sz="900" b="0" i="0" u="none" strike="noStrike" kern="1200" cap="none" spc="0" baseline="0">
               <a:solidFill>
@@ -25358,7 +25364,7 @@
                   <a:uFillTx/>
                 </a:defRPr>
               </a:pPr>
-              <a:t>July 12, 2025</a:t>
+              <a:t>July 13, 2025</a:t>
             </a:fld>
             <a:endParaRPr lang="en-US" sz="900" b="0" i="0" u="none" strike="noStrike" kern="1200" cap="none" spc="0" baseline="0">
               <a:solidFill>
@@ -27360,7 +27366,7 @@
                   <a:uFillTx/>
                 </a:defRPr>
               </a:pPr>
-              <a:t>12. Juli 2025</a:t>
+              <a:t>13. Juli 2025</a:t>
             </a:fld>
             <a:endParaRPr lang="de-DE" sz="900" b="0" i="0" u="none" strike="noStrike" kern="1200" cap="none" spc="0" baseline="0">
               <a:solidFill>
@@ -28177,7 +28183,7 @@
                   <a:uFillTx/>
                 </a:defRPr>
               </a:pPr>
-              <a:t>12. Juli 2025</a:t>
+              <a:t>13. Juli 2025</a:t>
             </a:fld>
             <a:endParaRPr lang="de-DE" sz="900" b="0" i="0" u="none" strike="noStrike" kern="1200" cap="none" spc="0" baseline="0">
               <a:solidFill>
@@ -28739,7 +28745,7 @@
                   <a:uFillTx/>
                 </a:defRPr>
               </a:pPr>
-              <a:t>12. Juli 2025</a:t>
+              <a:t>13. Juli 2025</a:t>
             </a:fld>
             <a:endParaRPr lang="de-DE" sz="900" b="0" i="0" u="none" strike="noStrike" kern="1200" cap="none" spc="0" baseline="0">
               <a:solidFill>
@@ -29280,7 +29286,7 @@
                   <a:uFillTx/>
                 </a:defRPr>
               </a:pPr>
-              <a:t>12. Juli 2025</a:t>
+              <a:t>13. Juli 2025</a:t>
             </a:fld>
             <a:endParaRPr lang="de-DE" sz="900" b="0" i="0" u="none" strike="noStrike" kern="1200" cap="none" spc="0" baseline="0">
               <a:solidFill>

</xml_diff>

<commit_message>
modified order of talking points in conclusion
</commit_message>
<xml_diff>
--- a/presentation/presentation.pptx
+++ b/presentation/presentation.pptx
@@ -22453,7 +22453,7 @@
           <a:p>
             <a:pPr lvl="1"/>
             <a:r>
-              <a:rPr lang="en-US">
+              <a:rPr lang="en-US" dirty="0">
                 <a:latin typeface="Calibri"/>
               </a:rPr>
               <a:t>Using “watch expression” is cumbersome</a:t>
@@ -22462,16 +22462,10 @@
           <a:p>
             <a:pPr lvl="0"/>
             <a:r>
-              <a:rPr lang="en-US" b="1">
-                <a:latin typeface="Calibri"/>
-              </a:rPr>
-              <a:t>Expand </a:t>
-            </a:r>
-            <a:r>
               <a:rPr lang="en-US" b="1" dirty="0">
                 <a:latin typeface="Calibri"/>
               </a:rPr>
-              <a:t>to other versions of </a:t>
+              <a:t>Expand to other versions of </a:t>
             </a:r>
             <a:r>
               <a:rPr lang="en-US" b="1" dirty="0" err="1">

</xml_diff>